<commit_message>
Updated admin object pages.
</commit_message>
<xml_diff>
--- a/data/automations/pages.pptx
+++ b/data/automations/pages.pptx
@@ -205,7 +205,7 @@
           <a:p>
             <a:fld id="{148A6914-CB7E-432F-9F4B-CC7F37DC0438}" type="datetimeFigureOut">
               <a:rPr lang="en-US" smtClean="0"/>
-              <a:t>8/9/2021</a:t>
+              <a:t>10/9/2021</a:t>
             </a:fld>
             <a:endParaRPr lang="en-US"/>
           </a:p>
@@ -687,7 +687,7 @@
           <a:p>
             <a:fld id="{C35190AA-E4B7-45C6-A812-1637583B9BF7}" type="datetimeFigureOut">
               <a:rPr lang="en-US" smtClean="0"/>
-              <a:t>8/9/2021</a:t>
+              <a:t>10/9/2021</a:t>
             </a:fld>
             <a:endParaRPr lang="en-US"/>
           </a:p>
@@ -857,7 +857,7 @@
           <a:p>
             <a:fld id="{C35190AA-E4B7-45C6-A812-1637583B9BF7}" type="datetimeFigureOut">
               <a:rPr lang="en-US" smtClean="0"/>
-              <a:t>8/9/2021</a:t>
+              <a:t>10/9/2021</a:t>
             </a:fld>
             <a:endParaRPr lang="en-US"/>
           </a:p>
@@ -1037,7 +1037,7 @@
           <a:p>
             <a:fld id="{C35190AA-E4B7-45C6-A812-1637583B9BF7}" type="datetimeFigureOut">
               <a:rPr lang="en-US" smtClean="0"/>
-              <a:t>8/9/2021</a:t>
+              <a:t>10/9/2021</a:t>
             </a:fld>
             <a:endParaRPr lang="en-US"/>
           </a:p>
@@ -1207,7 +1207,7 @@
           <a:p>
             <a:fld id="{C35190AA-E4B7-45C6-A812-1637583B9BF7}" type="datetimeFigureOut">
               <a:rPr lang="en-US" smtClean="0"/>
-              <a:t>8/9/2021</a:t>
+              <a:t>10/9/2021</a:t>
             </a:fld>
             <a:endParaRPr lang="en-US"/>
           </a:p>
@@ -1451,7 +1451,7 @@
           <a:p>
             <a:fld id="{C35190AA-E4B7-45C6-A812-1637583B9BF7}" type="datetimeFigureOut">
               <a:rPr lang="en-US" smtClean="0"/>
-              <a:t>8/9/2021</a:t>
+              <a:t>10/9/2021</a:t>
             </a:fld>
             <a:endParaRPr lang="en-US"/>
           </a:p>
@@ -1683,7 +1683,7 @@
           <a:p>
             <a:fld id="{C35190AA-E4B7-45C6-A812-1637583B9BF7}" type="datetimeFigureOut">
               <a:rPr lang="en-US" smtClean="0"/>
-              <a:t>8/9/2021</a:t>
+              <a:t>10/9/2021</a:t>
             </a:fld>
             <a:endParaRPr lang="en-US"/>
           </a:p>
@@ -2050,7 +2050,7 @@
           <a:p>
             <a:fld id="{C35190AA-E4B7-45C6-A812-1637583B9BF7}" type="datetimeFigureOut">
               <a:rPr lang="en-US" smtClean="0"/>
-              <a:t>8/9/2021</a:t>
+              <a:t>10/9/2021</a:t>
             </a:fld>
             <a:endParaRPr lang="en-US"/>
           </a:p>
@@ -2168,7 +2168,7 @@
           <a:p>
             <a:fld id="{C35190AA-E4B7-45C6-A812-1637583B9BF7}" type="datetimeFigureOut">
               <a:rPr lang="en-US" smtClean="0"/>
-              <a:t>8/9/2021</a:t>
+              <a:t>10/9/2021</a:t>
             </a:fld>
             <a:endParaRPr lang="en-US"/>
           </a:p>
@@ -2263,7 +2263,7 @@
           <a:p>
             <a:fld id="{C35190AA-E4B7-45C6-A812-1637583B9BF7}" type="datetimeFigureOut">
               <a:rPr lang="en-US" smtClean="0"/>
-              <a:t>8/9/2021</a:t>
+              <a:t>10/9/2021</a:t>
             </a:fld>
             <a:endParaRPr lang="en-US"/>
           </a:p>
@@ -2540,7 +2540,7 @@
           <a:p>
             <a:fld id="{C35190AA-E4B7-45C6-A812-1637583B9BF7}" type="datetimeFigureOut">
               <a:rPr lang="en-US" smtClean="0"/>
-              <a:t>8/9/2021</a:t>
+              <a:t>10/9/2021</a:t>
             </a:fld>
             <a:endParaRPr lang="en-US"/>
           </a:p>
@@ -2797,7 +2797,7 @@
           <a:p>
             <a:fld id="{C35190AA-E4B7-45C6-A812-1637583B9BF7}" type="datetimeFigureOut">
               <a:rPr lang="en-US" smtClean="0"/>
-              <a:t>8/9/2021</a:t>
+              <a:t>10/9/2021</a:t>
             </a:fld>
             <a:endParaRPr lang="en-US"/>
           </a:p>
@@ -3010,7 +3010,7 @@
           <a:p>
             <a:fld id="{C35190AA-E4B7-45C6-A812-1637583B9BF7}" type="datetimeFigureOut">
               <a:rPr lang="en-US" smtClean="0"/>
-              <a:t>8/9/2021</a:t>
+              <a:t>10/9/2021</a:t>
             </a:fld>
             <a:endParaRPr lang="en-US"/>
           </a:p>

</xml_diff>